<commit_message>
correcting Flynn's Taxonomy table
</commit_message>
<xml_diff>
--- a/imgs/Flynns Taxonomy.pptx
+++ b/imgs/Flynns Taxonomy.pptx
@@ -243,7 +243,7 @@
           <a:p>
             <a:fld id="{F12C872D-DF83-4487-AA63-66CAB1861F08}" type="datetimeFigureOut">
               <a:rPr lang="en-GB" smtClean="0"/>
-              <a:t>26/03/2018</a:t>
+              <a:t>29/03/2018</a:t>
             </a:fld>
             <a:endParaRPr lang="en-GB"/>
           </a:p>
@@ -413,7 +413,7 @@
           <a:p>
             <a:fld id="{F12C872D-DF83-4487-AA63-66CAB1861F08}" type="datetimeFigureOut">
               <a:rPr lang="en-GB" smtClean="0"/>
-              <a:t>26/03/2018</a:t>
+              <a:t>29/03/2018</a:t>
             </a:fld>
             <a:endParaRPr lang="en-GB"/>
           </a:p>
@@ -593,7 +593,7 @@
           <a:p>
             <a:fld id="{F12C872D-DF83-4487-AA63-66CAB1861F08}" type="datetimeFigureOut">
               <a:rPr lang="en-GB" smtClean="0"/>
-              <a:t>26/03/2018</a:t>
+              <a:t>29/03/2018</a:t>
             </a:fld>
             <a:endParaRPr lang="en-GB"/>
           </a:p>
@@ -763,7 +763,7 @@
           <a:p>
             <a:fld id="{F12C872D-DF83-4487-AA63-66CAB1861F08}" type="datetimeFigureOut">
               <a:rPr lang="en-GB" smtClean="0"/>
-              <a:t>26/03/2018</a:t>
+              <a:t>29/03/2018</a:t>
             </a:fld>
             <a:endParaRPr lang="en-GB"/>
           </a:p>
@@ -1009,7 +1009,7 @@
           <a:p>
             <a:fld id="{F12C872D-DF83-4487-AA63-66CAB1861F08}" type="datetimeFigureOut">
               <a:rPr lang="en-GB" smtClean="0"/>
-              <a:t>26/03/2018</a:t>
+              <a:t>29/03/2018</a:t>
             </a:fld>
             <a:endParaRPr lang="en-GB"/>
           </a:p>
@@ -1241,7 +1241,7 @@
           <a:p>
             <a:fld id="{F12C872D-DF83-4487-AA63-66CAB1861F08}" type="datetimeFigureOut">
               <a:rPr lang="en-GB" smtClean="0"/>
-              <a:t>26/03/2018</a:t>
+              <a:t>29/03/2018</a:t>
             </a:fld>
             <a:endParaRPr lang="en-GB"/>
           </a:p>
@@ -1608,7 +1608,7 @@
           <a:p>
             <a:fld id="{F12C872D-DF83-4487-AA63-66CAB1861F08}" type="datetimeFigureOut">
               <a:rPr lang="en-GB" smtClean="0"/>
-              <a:t>26/03/2018</a:t>
+              <a:t>29/03/2018</a:t>
             </a:fld>
             <a:endParaRPr lang="en-GB"/>
           </a:p>
@@ -1726,7 +1726,7 @@
           <a:p>
             <a:fld id="{F12C872D-DF83-4487-AA63-66CAB1861F08}" type="datetimeFigureOut">
               <a:rPr lang="en-GB" smtClean="0"/>
-              <a:t>26/03/2018</a:t>
+              <a:t>29/03/2018</a:t>
             </a:fld>
             <a:endParaRPr lang="en-GB"/>
           </a:p>
@@ -1821,7 +1821,7 @@
           <a:p>
             <a:fld id="{F12C872D-DF83-4487-AA63-66CAB1861F08}" type="datetimeFigureOut">
               <a:rPr lang="en-GB" smtClean="0"/>
-              <a:t>26/03/2018</a:t>
+              <a:t>29/03/2018</a:t>
             </a:fld>
             <a:endParaRPr lang="en-GB"/>
           </a:p>
@@ -2098,7 +2098,7 @@
           <a:p>
             <a:fld id="{F12C872D-DF83-4487-AA63-66CAB1861F08}" type="datetimeFigureOut">
               <a:rPr lang="en-GB" smtClean="0"/>
-              <a:t>26/03/2018</a:t>
+              <a:t>29/03/2018</a:t>
             </a:fld>
             <a:endParaRPr lang="en-GB"/>
           </a:p>
@@ -2355,7 +2355,7 @@
           <a:p>
             <a:fld id="{F12C872D-DF83-4487-AA63-66CAB1861F08}" type="datetimeFigureOut">
               <a:rPr lang="en-GB" smtClean="0"/>
-              <a:t>26/03/2018</a:t>
+              <a:t>29/03/2018</a:t>
             </a:fld>
             <a:endParaRPr lang="en-GB"/>
           </a:p>
@@ -2568,7 +2568,7 @@
           <a:p>
             <a:fld id="{F12C872D-DF83-4487-AA63-66CAB1861F08}" type="datetimeFigureOut">
               <a:rPr lang="en-GB" smtClean="0"/>
-              <a:t>26/03/2018</a:t>
+              <a:t>29/03/2018</a:t>
             </a:fld>
             <a:endParaRPr lang="en-GB"/>
           </a:p>
@@ -2988,14 +2988,14 @@
           <p:nvPr>
             <p:extLst>
               <p:ext uri="{D42A27DB-BD31-4B8C-83A1-F6EECF244321}">
-                <p14:modId xmlns:p14="http://schemas.microsoft.com/office/powerpoint/2010/main" val="1431200651"/>
+                <p14:modId xmlns:p14="http://schemas.microsoft.com/office/powerpoint/2010/main" val="1625779380"/>
               </p:ext>
             </p:extLst>
           </p:nvPr>
         </p:nvGraphicFramePr>
         <p:xfrm>
           <a:off x="0" y="-1"/>
-          <a:ext cx="11189368" cy="5898542"/>
+          <a:ext cx="11189368" cy="5919152"/>
         </p:xfrm>
         <a:graphic>
           <a:graphicData uri="http://schemas.openxmlformats.org/drawingml/2006/table">
@@ -3108,7 +3108,14 @@
                     <a:p>
                       <a:r>
                         <a:rPr lang="de-DE" sz="1200" dirty="0"/>
-                        <a:t>von Neumann Architektur:</a:t>
+                        <a:t>von Neumann Architektur /</a:t>
+                      </a:r>
+                      <a:br>
+                        <a:rPr lang="de-DE" sz="1200" dirty="0"/>
+                      </a:br>
+                      <a:r>
+                        <a:rPr lang="de-DE" sz="1200"/>
+                        <a:t>Harvard Architektur:</a:t>
                       </a:r>
                       <a:br>
                         <a:rPr lang="de-DE" sz="1200" dirty="0"/>
@@ -3187,7 +3194,17 @@
                       </a:br>
                       <a:r>
                         <a:rPr lang="de-DE" sz="1200" dirty="0"/>
-                        <a:t>z.B. Vektor Prozessoren </a:t>
+                        <a:t>z.B. </a:t>
+                      </a:r>
+                    </a:p>
+                    <a:p>
+                      <a:pPr marL="171450" indent="-171450">
+                        <a:buFont typeface="Arial" panose="020B0604020202020204" pitchFamily="34" charset="0"/>
+                        <a:buChar char="•"/>
+                      </a:pPr>
+                      <a:r>
+                        <a:rPr lang="de-DE" sz="1200" dirty="0"/>
+                        <a:t>Vektor Prozessoren </a:t>
                       </a:r>
                       <a:br>
                         <a:rPr lang="de-DE" sz="1200" dirty="0"/>
@@ -3198,8 +3215,12 @@
                       </a:r>
                     </a:p>
                     <a:p>
+                      <a:pPr marL="171450" indent="-171450">
+                        <a:buFont typeface="Arial" panose="020B0604020202020204" pitchFamily="34" charset="0"/>
+                        <a:buChar char="•"/>
+                      </a:pPr>
                       <a:r>
-                        <a:rPr lang="de-DE" sz="1200"/>
+                        <a:rPr lang="de-DE" sz="1200" dirty="0"/>
                         <a:t>Grafikprozessoren (GPUs)</a:t>
                       </a:r>
                       <a:endParaRPr lang="en-GB" sz="1200" dirty="0"/>
@@ -3262,7 +3283,21 @@
                       </a:br>
                       <a:r>
                         <a:rPr lang="de-DE" sz="1200" dirty="0"/>
-                        <a:t>z.B. aktuele Mehrkernprozessoren</a:t>
+                        <a:t>z.B. </a:t>
+                      </a:r>
+                    </a:p>
+                    <a:p>
+                      <a:pPr marL="171450" indent="-171450">
+                        <a:buFont typeface="Arial" panose="020B0604020202020204" pitchFamily="34" charset="0"/>
+                        <a:buChar char="•"/>
+                      </a:pPr>
+                      <a:r>
+                        <a:rPr lang="de-DE" sz="1200" dirty="0" err="1"/>
+                        <a:t>aktuele</a:t>
+                      </a:r>
+                      <a:r>
+                        <a:rPr lang="de-DE" sz="1200" dirty="0"/>
+                        <a:t> Mehrkernprozessoren</a:t>
                       </a:r>
                       <a:br>
                         <a:rPr lang="de-DE" sz="1200" dirty="0"/>
@@ -3277,7 +3312,7 @@
                     <a:bodyPr/>
                     <a:lstStyle/>
                     <a:p>
-                      <a:endParaRPr lang="en-GB" sz="1200"/>
+                      <a:endParaRPr lang="en-GB" sz="1200" dirty="0"/>
                     </a:p>
                   </a:txBody>
                   <a:tcPr/>
@@ -3334,14 +3369,27 @@
                       </a:br>
                       <a:r>
                         <a:rPr lang="de-DE" sz="1200" dirty="0"/>
-                        <a:t>z.B. redundante Architekturen </a:t>
+                        <a:t>z.B. </a:t>
                       </a:r>
-                      <a:br>
-                        <a:rPr lang="de-DE" sz="1200" dirty="0"/>
-                      </a:br>
+                    </a:p>
+                    <a:p>
+                      <a:pPr marL="171450" indent="-171450">
+                        <a:buFont typeface="Arial" panose="020B0604020202020204" pitchFamily="34" charset="0"/>
+                        <a:buChar char="•"/>
+                      </a:pPr>
                       <a:r>
                         <a:rPr lang="de-DE" sz="1200" dirty="0"/>
-                        <a:t>oder Pipelines in modernen Prozessoren</a:t>
+                        <a:t>redundante Architekturen</a:t>
+                      </a:r>
+                    </a:p>
+                    <a:p>
+                      <a:pPr marL="171450" indent="-171450">
+                        <a:buFont typeface="Arial" panose="020B0604020202020204" pitchFamily="34" charset="0"/>
+                        <a:buChar char="•"/>
+                      </a:pPr>
+                      <a:r>
+                        <a:rPr lang="de-DE" sz="1200" dirty="0"/>
+                        <a:t>Pipelines in modernen Prozessoren</a:t>
                       </a:r>
                       <a:br>
                         <a:rPr lang="de-DE" sz="1200" dirty="0"/>
@@ -4774,10 +4822,10 @@
       </p:grpSp>
       <p:grpSp>
         <p:nvGrpSpPr>
-          <p:cNvPr id="48" name="Group 47">
+          <p:cNvPr id="46" name="Group 45">
             <a:extLst>
               <a:ext uri="{FF2B5EF4-FFF2-40B4-BE49-F238E27FC236}">
-                <a16:creationId xmlns:a16="http://schemas.microsoft.com/office/drawing/2014/main" id="{F833B9AE-CC5D-425C-9148-5B669C114D6A}"/>
+                <a16:creationId xmlns:a16="http://schemas.microsoft.com/office/drawing/2014/main" id="{8DDCA02D-FB13-4A1B-BE90-6D381973BB48}"/>
               </a:ext>
             </a:extLst>
           </p:cNvPr>
@@ -4786,18 +4834,18 @@
         </p:nvGrpSpPr>
         <p:grpSpPr>
           <a:xfrm>
-            <a:off x="4239720" y="4555524"/>
+            <a:off x="4239720" y="4568794"/>
             <a:ext cx="6644003" cy="1075690"/>
-            <a:chOff x="5590064" y="1524003"/>
+            <a:chOff x="5590066" y="4014470"/>
             <a:chExt cx="6644003" cy="1075690"/>
           </a:xfrm>
         </p:grpSpPr>
         <p:sp>
           <p:nvSpPr>
-            <p:cNvPr id="49" name="Oval 48">
+            <p:cNvPr id="60" name="Oval 59">
               <a:extLst>
                 <a:ext uri="{FF2B5EF4-FFF2-40B4-BE49-F238E27FC236}">
-                  <a16:creationId xmlns:a16="http://schemas.microsoft.com/office/drawing/2014/main" id="{0866E584-33E6-4C3C-9142-0014C2B70328}"/>
+                  <a16:creationId xmlns:a16="http://schemas.microsoft.com/office/drawing/2014/main" id="{9D6092B8-8489-4830-A4F5-54AB1F71143C}"/>
                 </a:ext>
               </a:extLst>
             </p:cNvPr>
@@ -4806,7 +4854,166 @@
           </p:nvSpPr>
           <p:spPr>
             <a:xfrm>
-              <a:off x="10306207" y="1882143"/>
+              <a:off x="8055134" y="4014470"/>
+              <a:ext cx="1927860" cy="358140"/>
+            </a:xfrm>
+            <a:prstGeom prst="ellipse">
+              <a:avLst/>
+            </a:prstGeom>
+          </p:spPr>
+          <p:style>
+            <a:lnRef idx="2">
+              <a:schemeClr val="dk1"/>
+            </a:lnRef>
+            <a:fillRef idx="1">
+              <a:schemeClr val="lt1"/>
+            </a:fillRef>
+            <a:effectRef idx="0">
+              <a:schemeClr val="dk1"/>
+            </a:effectRef>
+            <a:fontRef idx="minor">
+              <a:schemeClr val="dk1"/>
+            </a:fontRef>
+          </p:style>
+          <p:txBody>
+            <a:bodyPr rot="0" spcFirstLastPara="0" vertOverflow="overflow" horzOverflow="overflow" vert="horz" wrap="square" lIns="91440" tIns="45720" rIns="91440" bIns="45720" numCol="1" spcCol="0" rtlCol="0" fromWordArt="0" anchor="ctr" anchorCtr="0" forceAA="0" compatLnSpc="1">
+              <a:prstTxWarp prst="textNoShape">
+                <a:avLst/>
+              </a:prstTxWarp>
+              <a:noAutofit/>
+            </a:bodyPr>
+            <a:lstStyle/>
+            <a:p>
+              <a:pPr algn="ctr"/>
+              <a:r>
+                <a:rPr lang="de-DE" sz="1200" dirty="0"/>
+                <a:t>Prozessor</a:t>
+              </a:r>
+              <a:endParaRPr lang="de-DE" dirty="0"/>
+            </a:p>
+          </p:txBody>
+        </p:sp>
+        <p:sp>
+          <p:nvSpPr>
+            <p:cNvPr id="61" name="Oval 60">
+              <a:extLst>
+                <a:ext uri="{FF2B5EF4-FFF2-40B4-BE49-F238E27FC236}">
+                  <a16:creationId xmlns:a16="http://schemas.microsoft.com/office/drawing/2014/main" id="{D788A868-9D4D-4EE8-9C05-B063E2244D9B}"/>
+                </a:ext>
+              </a:extLst>
+            </p:cNvPr>
+            <p:cNvSpPr/>
+            <p:nvPr/>
+          </p:nvSpPr>
+          <p:spPr>
+            <a:xfrm>
+              <a:off x="5590066" y="4373880"/>
+              <a:ext cx="1927860" cy="358140"/>
+            </a:xfrm>
+            <a:prstGeom prst="ellipse">
+              <a:avLst/>
+            </a:prstGeom>
+          </p:spPr>
+          <p:style>
+            <a:lnRef idx="2">
+              <a:schemeClr val="dk1"/>
+            </a:lnRef>
+            <a:fillRef idx="1">
+              <a:schemeClr val="lt1"/>
+            </a:fillRef>
+            <a:effectRef idx="0">
+              <a:schemeClr val="dk1"/>
+            </a:effectRef>
+            <a:fontRef idx="minor">
+              <a:schemeClr val="dk1"/>
+            </a:fontRef>
+          </p:style>
+          <p:txBody>
+            <a:bodyPr rot="0" spcFirstLastPara="0" vertOverflow="overflow" horzOverflow="overflow" vert="horz" wrap="square" lIns="91440" tIns="45720" rIns="91440" bIns="45720" numCol="1" spcCol="0" rtlCol="0" fromWordArt="0" anchor="ctr" anchorCtr="0" forceAA="0" compatLnSpc="1">
+              <a:prstTxWarp prst="textNoShape">
+                <a:avLst/>
+              </a:prstTxWarp>
+              <a:noAutofit/>
+            </a:bodyPr>
+            <a:lstStyle/>
+            <a:p>
+              <a:pPr algn="ctr"/>
+              <a:r>
+                <a:rPr lang="de-DE" sz="1200" dirty="0"/>
+                <a:t>Datenspeicher</a:t>
+              </a:r>
+              <a:endParaRPr lang="de-DE" dirty="0"/>
+            </a:p>
+          </p:txBody>
+        </p:sp>
+        <p:sp>
+          <p:nvSpPr>
+            <p:cNvPr id="62" name="Oval 61">
+              <a:extLst>
+                <a:ext uri="{FF2B5EF4-FFF2-40B4-BE49-F238E27FC236}">
+                  <a16:creationId xmlns:a16="http://schemas.microsoft.com/office/drawing/2014/main" id="{A6AD939E-BD68-4CFC-9B8E-E473257A64DE}"/>
+                </a:ext>
+              </a:extLst>
+            </p:cNvPr>
+            <p:cNvSpPr/>
+            <p:nvPr/>
+          </p:nvSpPr>
+          <p:spPr>
+            <a:xfrm>
+              <a:off x="8055134" y="4732020"/>
+              <a:ext cx="1927860" cy="358140"/>
+            </a:xfrm>
+            <a:prstGeom prst="ellipse">
+              <a:avLst/>
+            </a:prstGeom>
+          </p:spPr>
+          <p:style>
+            <a:lnRef idx="2">
+              <a:schemeClr val="dk1"/>
+            </a:lnRef>
+            <a:fillRef idx="1">
+              <a:schemeClr val="lt1"/>
+            </a:fillRef>
+            <a:effectRef idx="0">
+              <a:schemeClr val="dk1"/>
+            </a:effectRef>
+            <a:fontRef idx="minor">
+              <a:schemeClr val="dk1"/>
+            </a:fontRef>
+          </p:style>
+          <p:txBody>
+            <a:bodyPr rot="0" spcFirstLastPara="0" vertOverflow="overflow" horzOverflow="overflow" vert="horz" wrap="square" lIns="91440" tIns="45720" rIns="91440" bIns="45720" numCol="1" spcCol="0" rtlCol="0" fromWordArt="0" anchor="ctr" anchorCtr="0" forceAA="0" compatLnSpc="1">
+              <a:prstTxWarp prst="textNoShape">
+                <a:avLst/>
+              </a:prstTxWarp>
+              <a:noAutofit/>
+            </a:bodyPr>
+            <a:lstStyle/>
+            <a:p>
+              <a:pPr algn="ctr"/>
+              <a:r>
+                <a:rPr lang="de-DE" sz="1200" dirty="0"/>
+                <a:t>Prozessor</a:t>
+              </a:r>
+              <a:endParaRPr lang="de-DE" dirty="0"/>
+            </a:p>
+          </p:txBody>
+        </p:sp>
+        <p:sp>
+          <p:nvSpPr>
+            <p:cNvPr id="67" name="Oval 66">
+              <a:extLst>
+                <a:ext uri="{FF2B5EF4-FFF2-40B4-BE49-F238E27FC236}">
+                  <a16:creationId xmlns:a16="http://schemas.microsoft.com/office/drawing/2014/main" id="{A7A72DAA-0BC8-4017-8B1C-0E38781F9919}"/>
+                </a:ext>
+              </a:extLst>
+            </p:cNvPr>
+            <p:cNvSpPr/>
+            <p:nvPr/>
+          </p:nvSpPr>
+          <p:spPr>
+            <a:xfrm>
+              <a:off x="10306207" y="4014470"/>
               <a:ext cx="1927860" cy="358140"/>
             </a:xfrm>
             <a:prstGeom prst="ellipse">
@@ -4847,10 +5054,10 @@
         </p:sp>
         <p:sp>
           <p:nvSpPr>
-            <p:cNvPr id="50" name="Oval 49">
+            <p:cNvPr id="68" name="Oval 67">
               <a:extLst>
                 <a:ext uri="{FF2B5EF4-FFF2-40B4-BE49-F238E27FC236}">
-                  <a16:creationId xmlns:a16="http://schemas.microsoft.com/office/drawing/2014/main" id="{3D409C37-CC5A-4A06-A3A9-7CD635F56161}"/>
+                  <a16:creationId xmlns:a16="http://schemas.microsoft.com/office/drawing/2014/main" id="{4F741F73-018C-4A4B-B162-AC6EE641F5DE}"/>
                 </a:ext>
               </a:extLst>
             </p:cNvPr>
@@ -4859,7 +5066,7 @@
           </p:nvSpPr>
           <p:spPr>
             <a:xfrm>
-              <a:off x="5590064" y="1524003"/>
+              <a:off x="10306209" y="4732020"/>
               <a:ext cx="1927860" cy="358140"/>
             </a:xfrm>
             <a:prstGeom prst="ellipse">
@@ -4892,166 +5099,7 @@
               <a:pPr algn="ctr"/>
               <a:r>
                 <a:rPr lang="de-DE" sz="1200" dirty="0"/>
-                <a:t>Datenspeicher</a:t>
-              </a:r>
-              <a:endParaRPr lang="de-DE" dirty="0"/>
-            </a:p>
-          </p:txBody>
-        </p:sp>
-        <p:sp>
-          <p:nvSpPr>
-            <p:cNvPr id="51" name="Oval 50">
-              <a:extLst>
-                <a:ext uri="{FF2B5EF4-FFF2-40B4-BE49-F238E27FC236}">
-                  <a16:creationId xmlns:a16="http://schemas.microsoft.com/office/drawing/2014/main" id="{066B2FD1-CAAC-41BF-8A73-4404289279F1}"/>
-                </a:ext>
-              </a:extLst>
-            </p:cNvPr>
-            <p:cNvSpPr/>
-            <p:nvPr/>
-          </p:nvSpPr>
-          <p:spPr>
-            <a:xfrm>
-              <a:off x="7948136" y="1524003"/>
-              <a:ext cx="1927860" cy="358140"/>
-            </a:xfrm>
-            <a:prstGeom prst="ellipse">
-              <a:avLst/>
-            </a:prstGeom>
-          </p:spPr>
-          <p:style>
-            <a:lnRef idx="2">
-              <a:schemeClr val="dk1"/>
-            </a:lnRef>
-            <a:fillRef idx="1">
-              <a:schemeClr val="lt1"/>
-            </a:fillRef>
-            <a:effectRef idx="0">
-              <a:schemeClr val="dk1"/>
-            </a:effectRef>
-            <a:fontRef idx="minor">
-              <a:schemeClr val="dk1"/>
-            </a:fontRef>
-          </p:style>
-          <p:txBody>
-            <a:bodyPr rot="0" spcFirstLastPara="0" vertOverflow="overflow" horzOverflow="overflow" vert="horz" wrap="square" lIns="91440" tIns="45720" rIns="91440" bIns="45720" numCol="1" spcCol="0" rtlCol="0" fromWordArt="0" anchor="ctr" anchorCtr="0" forceAA="0" compatLnSpc="1">
-              <a:prstTxWarp prst="textNoShape">
-                <a:avLst/>
-              </a:prstTxWarp>
-              <a:noAutofit/>
-            </a:bodyPr>
-            <a:lstStyle/>
-            <a:p>
-              <a:pPr algn="ctr"/>
-              <a:r>
-                <a:rPr lang="de-DE" sz="1200" dirty="0"/>
-                <a:t>Prozessor</a:t>
-              </a:r>
-              <a:endParaRPr lang="de-DE" dirty="0"/>
-            </a:p>
-          </p:txBody>
-        </p:sp>
-        <p:sp>
-          <p:nvSpPr>
-            <p:cNvPr id="52" name="Oval 51">
-              <a:extLst>
-                <a:ext uri="{FF2B5EF4-FFF2-40B4-BE49-F238E27FC236}">
-                  <a16:creationId xmlns:a16="http://schemas.microsoft.com/office/drawing/2014/main" id="{7AA139A4-2A01-4CA4-A7B4-F30333AB4C94}"/>
-                </a:ext>
-              </a:extLst>
-            </p:cNvPr>
-            <p:cNvSpPr/>
-            <p:nvPr/>
-          </p:nvSpPr>
-          <p:spPr>
-            <a:xfrm>
-              <a:off x="5590064" y="2241553"/>
-              <a:ext cx="1927860" cy="358140"/>
-            </a:xfrm>
-            <a:prstGeom prst="ellipse">
-              <a:avLst/>
-            </a:prstGeom>
-          </p:spPr>
-          <p:style>
-            <a:lnRef idx="2">
-              <a:schemeClr val="dk1"/>
-            </a:lnRef>
-            <a:fillRef idx="1">
-              <a:schemeClr val="lt1"/>
-            </a:fillRef>
-            <a:effectRef idx="0">
-              <a:schemeClr val="dk1"/>
-            </a:effectRef>
-            <a:fontRef idx="minor">
-              <a:schemeClr val="dk1"/>
-            </a:fontRef>
-          </p:style>
-          <p:txBody>
-            <a:bodyPr rot="0" spcFirstLastPara="0" vertOverflow="overflow" horzOverflow="overflow" vert="horz" wrap="square" lIns="91440" tIns="45720" rIns="91440" bIns="45720" numCol="1" spcCol="0" rtlCol="0" fromWordArt="0" anchor="ctr" anchorCtr="0" forceAA="0" compatLnSpc="1">
-              <a:prstTxWarp prst="textNoShape">
-                <a:avLst/>
-              </a:prstTxWarp>
-              <a:noAutofit/>
-            </a:bodyPr>
-            <a:lstStyle/>
-            <a:p>
-              <a:pPr algn="ctr"/>
-              <a:r>
-                <a:rPr lang="de-DE" sz="1200" dirty="0"/>
-                <a:t>Datenspeicher</a:t>
-              </a:r>
-              <a:endParaRPr lang="de-DE" dirty="0"/>
-            </a:p>
-          </p:txBody>
-        </p:sp>
-        <p:sp>
-          <p:nvSpPr>
-            <p:cNvPr id="53" name="Oval 52">
-              <a:extLst>
-                <a:ext uri="{FF2B5EF4-FFF2-40B4-BE49-F238E27FC236}">
-                  <a16:creationId xmlns:a16="http://schemas.microsoft.com/office/drawing/2014/main" id="{D7F044FB-0C2E-4478-A52E-130D63D47B22}"/>
-                </a:ext>
-              </a:extLst>
-            </p:cNvPr>
-            <p:cNvSpPr/>
-            <p:nvPr/>
-          </p:nvSpPr>
-          <p:spPr>
-            <a:xfrm>
-              <a:off x="7948136" y="2241552"/>
-              <a:ext cx="1927860" cy="358140"/>
-            </a:xfrm>
-            <a:prstGeom prst="ellipse">
-              <a:avLst/>
-            </a:prstGeom>
-          </p:spPr>
-          <p:style>
-            <a:lnRef idx="2">
-              <a:schemeClr val="dk1"/>
-            </a:lnRef>
-            <a:fillRef idx="1">
-              <a:schemeClr val="lt1"/>
-            </a:fillRef>
-            <a:effectRef idx="0">
-              <a:schemeClr val="dk1"/>
-            </a:effectRef>
-            <a:fontRef idx="minor">
-              <a:schemeClr val="dk1"/>
-            </a:fontRef>
-          </p:style>
-          <p:txBody>
-            <a:bodyPr rot="0" spcFirstLastPara="0" vertOverflow="overflow" horzOverflow="overflow" vert="horz" wrap="square" lIns="91440" tIns="45720" rIns="91440" bIns="45720" numCol="1" spcCol="0" rtlCol="0" fromWordArt="0" anchor="ctr" anchorCtr="0" forceAA="0" compatLnSpc="1">
-              <a:prstTxWarp prst="textNoShape">
-                <a:avLst/>
-              </a:prstTxWarp>
-              <a:noAutofit/>
-            </a:bodyPr>
-            <a:lstStyle/>
-            <a:p>
-              <a:pPr algn="ctr"/>
-              <a:r>
-                <a:rPr lang="de-DE" sz="1200" dirty="0"/>
-                <a:t>Prozessor</a:t>
+                <a:t>Programmspeicher</a:t>
               </a:r>
               <a:endParaRPr lang="de-DE" dirty="0"/>
             </a:p>
@@ -5059,32 +5107,27 @@
         </p:sp>
         <p:cxnSp>
           <p:nvCxnSpPr>
-            <p:cNvPr id="54" name="Connector: Elbow 53">
+            <p:cNvPr id="69" name="Straight Arrow Connector 68">
               <a:extLst>
                 <a:ext uri="{FF2B5EF4-FFF2-40B4-BE49-F238E27FC236}">
-                  <a16:creationId xmlns:a16="http://schemas.microsoft.com/office/drawing/2014/main" id="{D61F18D7-246A-49CC-A35F-DD0511509D1F}"/>
+                  <a16:creationId xmlns:a16="http://schemas.microsoft.com/office/drawing/2014/main" id="{31506E98-6C0C-4966-9268-8175FACAA8C4}"/>
                 </a:ext>
               </a:extLst>
             </p:cNvPr>
             <p:cNvCxnSpPr>
-              <a:cxnSpLocks/>
-              <a:stCxn id="51" idx="6"/>
-              <a:endCxn id="53" idx="6"/>
+              <a:stCxn id="67" idx="2"/>
             </p:cNvCxnSpPr>
             <p:nvPr/>
           </p:nvCxnSpPr>
           <p:spPr>
-            <a:xfrm>
-              <a:off x="9875996" y="1703074"/>
-              <a:ext cx="12700" cy="717549"/>
+            <a:xfrm flipH="1">
+              <a:off x="9982995" y="4193540"/>
+              <a:ext cx="323213" cy="0"/>
             </a:xfrm>
-            <a:prstGeom prst="bentConnector3">
-              <a:avLst>
-                <a:gd name="adj1" fmla="val 1800000"/>
-              </a:avLst>
+            <a:prstGeom prst="straightConnector1">
+              <a:avLst/>
             </a:prstGeom>
             <a:ln>
-              <a:headEnd type="triangle"/>
               <a:tailEnd type="triangle"/>
             </a:ln>
           </p:spPr>
@@ -5105,197 +5148,29 @@
         </p:cxnSp>
         <p:cxnSp>
           <p:nvCxnSpPr>
-            <p:cNvPr id="55" name="Straight Connector 54">
+            <p:cNvPr id="70" name="Straight Arrow Connector 69">
               <a:extLst>
                 <a:ext uri="{FF2B5EF4-FFF2-40B4-BE49-F238E27FC236}">
-                  <a16:creationId xmlns:a16="http://schemas.microsoft.com/office/drawing/2014/main" id="{F5200A58-BFB2-4791-B832-D332C3EADE24}"/>
+                  <a16:creationId xmlns:a16="http://schemas.microsoft.com/office/drawing/2014/main" id="{6623BCE1-104A-4096-BB9D-169588DD79AF}"/>
                 </a:ext>
               </a:extLst>
             </p:cNvPr>
             <p:cNvCxnSpPr>
-              <a:cxnSpLocks/>
-              <a:stCxn id="49" idx="2"/>
+              <a:stCxn id="68" idx="2"/>
+              <a:endCxn id="62" idx="6"/>
             </p:cNvCxnSpPr>
             <p:nvPr/>
           </p:nvCxnSpPr>
           <p:spPr>
             <a:xfrm flipH="1">
-              <a:off x="10102851" y="2061213"/>
-              <a:ext cx="203357" cy="0"/>
-            </a:xfrm>
-            <a:prstGeom prst="line">
-              <a:avLst/>
-            </a:prstGeom>
-          </p:spPr>
-          <p:style>
-            <a:lnRef idx="1">
-              <a:schemeClr val="dk1"/>
-            </a:lnRef>
-            <a:fillRef idx="0">
-              <a:schemeClr val="dk1"/>
-            </a:fillRef>
-            <a:effectRef idx="0">
-              <a:schemeClr val="dk1"/>
-            </a:effectRef>
-            <a:fontRef idx="minor">
-              <a:schemeClr val="tx1"/>
-            </a:fontRef>
-          </p:style>
-        </p:cxnSp>
-        <p:cxnSp>
-          <p:nvCxnSpPr>
-            <p:cNvPr id="56" name="Straight Arrow Connector 55">
-              <a:extLst>
-                <a:ext uri="{FF2B5EF4-FFF2-40B4-BE49-F238E27FC236}">
-                  <a16:creationId xmlns:a16="http://schemas.microsoft.com/office/drawing/2014/main" id="{4C0C111C-593F-46D5-B59E-ABBD276B3377}"/>
-                </a:ext>
-              </a:extLst>
-            </p:cNvPr>
-            <p:cNvCxnSpPr>
-              <a:cxnSpLocks/>
-              <a:stCxn id="50" idx="6"/>
-              <a:endCxn id="51" idx="2"/>
-            </p:cNvCxnSpPr>
-            <p:nvPr/>
-          </p:nvCxnSpPr>
-          <p:spPr>
-            <a:xfrm>
-              <a:off x="7517924" y="1703073"/>
-              <a:ext cx="430212" cy="0"/>
+              <a:off x="9982995" y="4911090"/>
+              <a:ext cx="323215" cy="0"/>
             </a:xfrm>
             <a:prstGeom prst="straightConnector1">
               <a:avLst/>
             </a:prstGeom>
             <a:ln>
-              <a:headEnd type="triangle"/>
               <a:tailEnd type="triangle"/>
-            </a:ln>
-          </p:spPr>
-          <p:style>
-            <a:lnRef idx="1">
-              <a:schemeClr val="dk1"/>
-            </a:lnRef>
-            <a:fillRef idx="0">
-              <a:schemeClr val="dk1"/>
-            </a:fillRef>
-            <a:effectRef idx="0">
-              <a:schemeClr val="dk1"/>
-            </a:effectRef>
-            <a:fontRef idx="minor">
-              <a:schemeClr val="tx1"/>
-            </a:fontRef>
-          </p:style>
-        </p:cxnSp>
-        <p:cxnSp>
-          <p:nvCxnSpPr>
-            <p:cNvPr id="57" name="Straight Arrow Connector 56">
-              <a:extLst>
-                <a:ext uri="{FF2B5EF4-FFF2-40B4-BE49-F238E27FC236}">
-                  <a16:creationId xmlns:a16="http://schemas.microsoft.com/office/drawing/2014/main" id="{D68A7419-3364-418E-B234-457496784051}"/>
-                </a:ext>
-              </a:extLst>
-            </p:cNvPr>
-            <p:cNvCxnSpPr>
-              <a:stCxn id="52" idx="6"/>
-              <a:endCxn id="53" idx="2"/>
-            </p:cNvCxnSpPr>
-            <p:nvPr/>
-          </p:nvCxnSpPr>
-          <p:spPr>
-            <a:xfrm flipV="1">
-              <a:off x="7517924" y="2420623"/>
-              <a:ext cx="430212" cy="1"/>
-            </a:xfrm>
-            <a:prstGeom prst="straightConnector1">
-              <a:avLst/>
-            </a:prstGeom>
-            <a:ln>
-              <a:headEnd type="triangle"/>
-              <a:tailEnd type="triangle"/>
-            </a:ln>
-          </p:spPr>
-          <p:style>
-            <a:lnRef idx="1">
-              <a:schemeClr val="dk1"/>
-            </a:lnRef>
-            <a:fillRef idx="0">
-              <a:schemeClr val="dk1"/>
-            </a:fillRef>
-            <a:effectRef idx="0">
-              <a:schemeClr val="dk1"/>
-            </a:effectRef>
-            <a:fontRef idx="minor">
-              <a:schemeClr val="tx1"/>
-            </a:fontRef>
-          </p:style>
-        </p:cxnSp>
-        <p:cxnSp>
-          <p:nvCxnSpPr>
-            <p:cNvPr id="58" name="Straight Connector 57">
-              <a:extLst>
-                <a:ext uri="{FF2B5EF4-FFF2-40B4-BE49-F238E27FC236}">
-                  <a16:creationId xmlns:a16="http://schemas.microsoft.com/office/drawing/2014/main" id="{D21CDDCC-CBED-49A5-8CDF-9DFA2833A12C}"/>
-                </a:ext>
-              </a:extLst>
-            </p:cNvPr>
-            <p:cNvCxnSpPr>
-              <a:stCxn id="50" idx="2"/>
-              <a:endCxn id="52" idx="2"/>
-            </p:cNvCxnSpPr>
-            <p:nvPr/>
-          </p:nvCxnSpPr>
-          <p:spPr>
-            <a:xfrm>
-              <a:off x="5590064" y="1703073"/>
-              <a:ext cx="0" cy="717550"/>
-            </a:xfrm>
-            <a:prstGeom prst="line">
-              <a:avLst/>
-            </a:prstGeom>
-            <a:ln>
-              <a:prstDash val="dash"/>
-            </a:ln>
-          </p:spPr>
-          <p:style>
-            <a:lnRef idx="1">
-              <a:schemeClr val="dk1"/>
-            </a:lnRef>
-            <a:fillRef idx="0">
-              <a:schemeClr val="dk1"/>
-            </a:fillRef>
-            <a:effectRef idx="0">
-              <a:schemeClr val="dk1"/>
-            </a:effectRef>
-            <a:fontRef idx="minor">
-              <a:schemeClr val="tx1"/>
-            </a:fontRef>
-          </p:style>
-        </p:cxnSp>
-        <p:cxnSp>
-          <p:nvCxnSpPr>
-            <p:cNvPr id="59" name="Straight Connector 58">
-              <a:extLst>
-                <a:ext uri="{FF2B5EF4-FFF2-40B4-BE49-F238E27FC236}">
-                  <a16:creationId xmlns:a16="http://schemas.microsoft.com/office/drawing/2014/main" id="{8C193A1A-D6C2-4D88-8190-1738772F5504}"/>
-                </a:ext>
-              </a:extLst>
-            </p:cNvPr>
-            <p:cNvCxnSpPr>
-              <a:stCxn id="50" idx="6"/>
-              <a:endCxn id="52" idx="6"/>
-            </p:cNvCxnSpPr>
-            <p:nvPr/>
-          </p:nvCxnSpPr>
-          <p:spPr>
-            <a:xfrm>
-              <a:off x="7517924" y="1703073"/>
-              <a:ext cx="0" cy="717550"/>
-            </a:xfrm>
-            <a:prstGeom prst="line">
-              <a:avLst/>
-            </a:prstGeom>
-            <a:ln>
-              <a:prstDash val="dash"/>
             </a:ln>
           </p:spPr>
           <p:style>
@@ -5314,6 +5189,90 @@
           </p:style>
         </p:cxnSp>
       </p:grpSp>
+      <p:cxnSp>
+        <p:nvCxnSpPr>
+          <p:cNvPr id="3" name="Connector: Elbow 2">
+            <a:extLst>
+              <a:ext uri="{FF2B5EF4-FFF2-40B4-BE49-F238E27FC236}">
+                <a16:creationId xmlns:a16="http://schemas.microsoft.com/office/drawing/2014/main" id="{E2C8F208-56CF-4782-AE22-58DAA6A90FDE}"/>
+              </a:ext>
+            </a:extLst>
+          </p:cNvPr>
+          <p:cNvCxnSpPr>
+            <a:endCxn id="60" idx="2"/>
+          </p:cNvCxnSpPr>
+          <p:nvPr/>
+        </p:nvCxnSpPr>
+        <p:spPr>
+          <a:xfrm flipV="1">
+            <a:off x="6167580" y="4747864"/>
+            <a:ext cx="537208" cy="341494"/>
+          </a:xfrm>
+          <a:prstGeom prst="bentConnector3">
+            <a:avLst/>
+          </a:prstGeom>
+          <a:ln>
+            <a:headEnd type="triangle"/>
+            <a:tailEnd type="triangle"/>
+          </a:ln>
+        </p:spPr>
+        <p:style>
+          <a:lnRef idx="1">
+            <a:schemeClr val="dk1"/>
+          </a:lnRef>
+          <a:fillRef idx="0">
+            <a:schemeClr val="dk1"/>
+          </a:fillRef>
+          <a:effectRef idx="0">
+            <a:schemeClr val="dk1"/>
+          </a:effectRef>
+          <a:fontRef idx="minor">
+            <a:schemeClr val="tx1"/>
+          </a:fontRef>
+        </p:style>
+      </p:cxnSp>
+      <p:cxnSp>
+        <p:nvCxnSpPr>
+          <p:cNvPr id="38" name="Connector: Elbow 37">
+            <a:extLst>
+              <a:ext uri="{FF2B5EF4-FFF2-40B4-BE49-F238E27FC236}">
+                <a16:creationId xmlns:a16="http://schemas.microsoft.com/office/drawing/2014/main" id="{C6046895-DEC7-4F82-83A0-346484B7A278}"/>
+              </a:ext>
+            </a:extLst>
+          </p:cNvPr>
+          <p:cNvCxnSpPr>
+            <a:endCxn id="62" idx="2"/>
+          </p:cNvCxnSpPr>
+          <p:nvPr/>
+        </p:nvCxnSpPr>
+        <p:spPr>
+          <a:xfrm>
+            <a:off x="6167580" y="5089358"/>
+            <a:ext cx="537208" cy="376056"/>
+          </a:xfrm>
+          <a:prstGeom prst="bentConnector3">
+            <a:avLst/>
+          </a:prstGeom>
+          <a:ln>
+            <a:headEnd type="triangle"/>
+            <a:tailEnd type="triangle"/>
+          </a:ln>
+        </p:spPr>
+        <p:style>
+          <a:lnRef idx="1">
+            <a:schemeClr val="dk1"/>
+          </a:lnRef>
+          <a:fillRef idx="0">
+            <a:schemeClr val="dk1"/>
+          </a:fillRef>
+          <a:effectRef idx="0">
+            <a:schemeClr val="dk1"/>
+          </a:effectRef>
+          <a:fontRef idx="minor">
+            <a:schemeClr val="tx1"/>
+          </a:fontRef>
+        </p:style>
+      </p:cxnSp>
     </p:spTree>
     <p:extLst>
       <p:ext uri="{BB962C8B-B14F-4D97-AF65-F5344CB8AC3E}">

</xml_diff>

<commit_message>
correcting a spelling error
</commit_message>
<xml_diff>
--- a/imgs/Flynns Taxonomy.pptx
+++ b/imgs/Flynns Taxonomy.pptx
@@ -243,7 +243,7 @@
           <a:p>
             <a:fld id="{F12C872D-DF83-4487-AA63-66CAB1861F08}" type="datetimeFigureOut">
               <a:rPr lang="en-GB" smtClean="0"/>
-              <a:t>29/03/2018</a:t>
+              <a:t>03/04/2018</a:t>
             </a:fld>
             <a:endParaRPr lang="en-GB"/>
           </a:p>
@@ -413,7 +413,7 @@
           <a:p>
             <a:fld id="{F12C872D-DF83-4487-AA63-66CAB1861F08}" type="datetimeFigureOut">
               <a:rPr lang="en-GB" smtClean="0"/>
-              <a:t>29/03/2018</a:t>
+              <a:t>03/04/2018</a:t>
             </a:fld>
             <a:endParaRPr lang="en-GB"/>
           </a:p>
@@ -593,7 +593,7 @@
           <a:p>
             <a:fld id="{F12C872D-DF83-4487-AA63-66CAB1861F08}" type="datetimeFigureOut">
               <a:rPr lang="en-GB" smtClean="0"/>
-              <a:t>29/03/2018</a:t>
+              <a:t>03/04/2018</a:t>
             </a:fld>
             <a:endParaRPr lang="en-GB"/>
           </a:p>
@@ -763,7 +763,7 @@
           <a:p>
             <a:fld id="{F12C872D-DF83-4487-AA63-66CAB1861F08}" type="datetimeFigureOut">
               <a:rPr lang="en-GB" smtClean="0"/>
-              <a:t>29/03/2018</a:t>
+              <a:t>03/04/2018</a:t>
             </a:fld>
             <a:endParaRPr lang="en-GB"/>
           </a:p>
@@ -1009,7 +1009,7 @@
           <a:p>
             <a:fld id="{F12C872D-DF83-4487-AA63-66CAB1861F08}" type="datetimeFigureOut">
               <a:rPr lang="en-GB" smtClean="0"/>
-              <a:t>29/03/2018</a:t>
+              <a:t>03/04/2018</a:t>
             </a:fld>
             <a:endParaRPr lang="en-GB"/>
           </a:p>
@@ -1241,7 +1241,7 @@
           <a:p>
             <a:fld id="{F12C872D-DF83-4487-AA63-66CAB1861F08}" type="datetimeFigureOut">
               <a:rPr lang="en-GB" smtClean="0"/>
-              <a:t>29/03/2018</a:t>
+              <a:t>03/04/2018</a:t>
             </a:fld>
             <a:endParaRPr lang="en-GB"/>
           </a:p>
@@ -1608,7 +1608,7 @@
           <a:p>
             <a:fld id="{F12C872D-DF83-4487-AA63-66CAB1861F08}" type="datetimeFigureOut">
               <a:rPr lang="en-GB" smtClean="0"/>
-              <a:t>29/03/2018</a:t>
+              <a:t>03/04/2018</a:t>
             </a:fld>
             <a:endParaRPr lang="en-GB"/>
           </a:p>
@@ -1726,7 +1726,7 @@
           <a:p>
             <a:fld id="{F12C872D-DF83-4487-AA63-66CAB1861F08}" type="datetimeFigureOut">
               <a:rPr lang="en-GB" smtClean="0"/>
-              <a:t>29/03/2018</a:t>
+              <a:t>03/04/2018</a:t>
             </a:fld>
             <a:endParaRPr lang="en-GB"/>
           </a:p>
@@ -1821,7 +1821,7 @@
           <a:p>
             <a:fld id="{F12C872D-DF83-4487-AA63-66CAB1861F08}" type="datetimeFigureOut">
               <a:rPr lang="en-GB" smtClean="0"/>
-              <a:t>29/03/2018</a:t>
+              <a:t>03/04/2018</a:t>
             </a:fld>
             <a:endParaRPr lang="en-GB"/>
           </a:p>
@@ -2098,7 +2098,7 @@
           <a:p>
             <a:fld id="{F12C872D-DF83-4487-AA63-66CAB1861F08}" type="datetimeFigureOut">
               <a:rPr lang="en-GB" smtClean="0"/>
-              <a:t>29/03/2018</a:t>
+              <a:t>03/04/2018</a:t>
             </a:fld>
             <a:endParaRPr lang="en-GB"/>
           </a:p>
@@ -2355,7 +2355,7 @@
           <a:p>
             <a:fld id="{F12C872D-DF83-4487-AA63-66CAB1861F08}" type="datetimeFigureOut">
               <a:rPr lang="en-GB" smtClean="0"/>
-              <a:t>29/03/2018</a:t>
+              <a:t>03/04/2018</a:t>
             </a:fld>
             <a:endParaRPr lang="en-GB"/>
           </a:p>
@@ -2568,7 +2568,7 @@
           <a:p>
             <a:fld id="{F12C872D-DF83-4487-AA63-66CAB1861F08}" type="datetimeFigureOut">
               <a:rPr lang="en-GB" smtClean="0"/>
-              <a:t>29/03/2018</a:t>
+              <a:t>03/04/2018</a:t>
             </a:fld>
             <a:endParaRPr lang="en-GB"/>
           </a:p>
@@ -2988,7 +2988,7 @@
           <p:nvPr>
             <p:extLst>
               <p:ext uri="{D42A27DB-BD31-4B8C-83A1-F6EECF244321}">
-                <p14:modId xmlns:p14="http://schemas.microsoft.com/office/powerpoint/2010/main" val="1625779380"/>
+                <p14:modId xmlns:p14="http://schemas.microsoft.com/office/powerpoint/2010/main" val="2232739918"/>
               </p:ext>
             </p:extLst>
           </p:nvPr>
@@ -3292,12 +3292,8 @@
                         <a:buChar char="•"/>
                       </a:pPr>
                       <a:r>
-                        <a:rPr lang="de-DE" sz="1200" dirty="0" err="1"/>
-                        <a:t>aktuele</a:t>
-                      </a:r>
-                      <a:r>
                         <a:rPr lang="de-DE" sz="1200" dirty="0"/>
-                        <a:t> Mehrkernprozessoren</a:t>
+                        <a:t>aktuelle Mehrkernprozessoren</a:t>
                       </a:r>
                       <a:br>
                         <a:rPr lang="de-DE" sz="1200" dirty="0"/>

</xml_diff>